<commit_message>
[2023-12-12] Interceptor를 통한 보안 설정
</commit_message>
<xml_diff>
--- a/프로젝트 생성.pptx
+++ b/프로젝트 생성.pptx
@@ -107,6 +107,11 @@
       </a:defRPr>
     </a:lvl9pPr>
   </p:defaultTextStyle>
+  <p:extLst>
+    <p:ext uri="{EFAFB233-063F-42B5-8137-9DF3F51BA10A}">
+      <p15:sldGuideLst xmlns:p15="http://schemas.microsoft.com/office/powerpoint/2012/main"/>
+    </p:ext>
+  </p:extLst>
 </p:presentation>
 </file>
 
@@ -241,7 +246,7 @@
           <a:p>
             <a:fld id="{4DB9B140-CF9C-4434-A045-099B31DCF030}" type="datetimeFigureOut">
               <a:rPr lang="ko-KR" altLang="en-US" smtClean="0"/>
-              <a:t>2023-12-08</a:t>
+              <a:t>2023-12-12</a:t>
             </a:fld>
             <a:endParaRPr lang="ko-KR" altLang="en-US"/>
           </a:p>
@@ -411,7 +416,7 @@
           <a:p>
             <a:fld id="{4DB9B140-CF9C-4434-A045-099B31DCF030}" type="datetimeFigureOut">
               <a:rPr lang="ko-KR" altLang="en-US" smtClean="0"/>
-              <a:t>2023-12-08</a:t>
+              <a:t>2023-12-12</a:t>
             </a:fld>
             <a:endParaRPr lang="ko-KR" altLang="en-US"/>
           </a:p>
@@ -591,7 +596,7 @@
           <a:p>
             <a:fld id="{4DB9B140-CF9C-4434-A045-099B31DCF030}" type="datetimeFigureOut">
               <a:rPr lang="ko-KR" altLang="en-US" smtClean="0"/>
-              <a:t>2023-12-08</a:t>
+              <a:t>2023-12-12</a:t>
             </a:fld>
             <a:endParaRPr lang="ko-KR" altLang="en-US"/>
           </a:p>
@@ -761,7 +766,7 @@
           <a:p>
             <a:fld id="{4DB9B140-CF9C-4434-A045-099B31DCF030}" type="datetimeFigureOut">
               <a:rPr lang="ko-KR" altLang="en-US" smtClean="0"/>
-              <a:t>2023-12-08</a:t>
+              <a:t>2023-12-12</a:t>
             </a:fld>
             <a:endParaRPr lang="ko-KR" altLang="en-US"/>
           </a:p>
@@ -1007,7 +1012,7 @@
           <a:p>
             <a:fld id="{4DB9B140-CF9C-4434-A045-099B31DCF030}" type="datetimeFigureOut">
               <a:rPr lang="ko-KR" altLang="en-US" smtClean="0"/>
-              <a:t>2023-12-08</a:t>
+              <a:t>2023-12-12</a:t>
             </a:fld>
             <a:endParaRPr lang="ko-KR" altLang="en-US"/>
           </a:p>
@@ -1239,7 +1244,7 @@
           <a:p>
             <a:fld id="{4DB9B140-CF9C-4434-A045-099B31DCF030}" type="datetimeFigureOut">
               <a:rPr lang="ko-KR" altLang="en-US" smtClean="0"/>
-              <a:t>2023-12-08</a:t>
+              <a:t>2023-12-12</a:t>
             </a:fld>
             <a:endParaRPr lang="ko-KR" altLang="en-US"/>
           </a:p>
@@ -1606,7 +1611,7 @@
           <a:p>
             <a:fld id="{4DB9B140-CF9C-4434-A045-099B31DCF030}" type="datetimeFigureOut">
               <a:rPr lang="ko-KR" altLang="en-US" smtClean="0"/>
-              <a:t>2023-12-08</a:t>
+              <a:t>2023-12-12</a:t>
             </a:fld>
             <a:endParaRPr lang="ko-KR" altLang="en-US"/>
           </a:p>
@@ -1724,7 +1729,7 @@
           <a:p>
             <a:fld id="{4DB9B140-CF9C-4434-A045-099B31DCF030}" type="datetimeFigureOut">
               <a:rPr lang="ko-KR" altLang="en-US" smtClean="0"/>
-              <a:t>2023-12-08</a:t>
+              <a:t>2023-12-12</a:t>
             </a:fld>
             <a:endParaRPr lang="ko-KR" altLang="en-US"/>
           </a:p>
@@ -1819,7 +1824,7 @@
           <a:p>
             <a:fld id="{4DB9B140-CF9C-4434-A045-099B31DCF030}" type="datetimeFigureOut">
               <a:rPr lang="ko-KR" altLang="en-US" smtClean="0"/>
-              <a:t>2023-12-08</a:t>
+              <a:t>2023-12-12</a:t>
             </a:fld>
             <a:endParaRPr lang="ko-KR" altLang="en-US"/>
           </a:p>
@@ -2096,7 +2101,7 @@
           <a:p>
             <a:fld id="{4DB9B140-CF9C-4434-A045-099B31DCF030}" type="datetimeFigureOut">
               <a:rPr lang="ko-KR" altLang="en-US" smtClean="0"/>
-              <a:t>2023-12-08</a:t>
+              <a:t>2023-12-12</a:t>
             </a:fld>
             <a:endParaRPr lang="ko-KR" altLang="en-US"/>
           </a:p>
@@ -2349,7 +2354,7 @@
           <a:p>
             <a:fld id="{4DB9B140-CF9C-4434-A045-099B31DCF030}" type="datetimeFigureOut">
               <a:rPr lang="ko-KR" altLang="en-US" smtClean="0"/>
-              <a:t>2023-12-08</a:t>
+              <a:t>2023-12-12</a:t>
             </a:fld>
             <a:endParaRPr lang="ko-KR" altLang="en-US"/>
           </a:p>
@@ -2562,7 +2567,7 @@
           <a:p>
             <a:fld id="{4DB9B140-CF9C-4434-A045-099B31DCF030}" type="datetimeFigureOut">
               <a:rPr lang="ko-KR" altLang="en-US" smtClean="0"/>
-              <a:t>2023-12-08</a:t>
+              <a:t>2023-12-12</a:t>
             </a:fld>
             <a:endParaRPr lang="ko-KR" altLang="en-US"/>
           </a:p>
@@ -4158,6 +4163,211 @@
           </a:p>
         </p:txBody>
       </p:sp>
+      <p:sp>
+        <p:nvSpPr>
+          <p:cNvPr id="2" name="TextBox 1"/>
+          <p:cNvSpPr txBox="1"/>
+          <p:nvPr/>
+        </p:nvSpPr>
+        <p:spPr>
+          <a:xfrm>
+            <a:off x="474785" y="5222630"/>
+            <a:ext cx="3567964" cy="1200329"/>
+          </a:xfrm>
+          <a:prstGeom prst="rect">
+            <a:avLst/>
+          </a:prstGeom>
+          <a:noFill/>
+        </p:spPr>
+        <p:txBody>
+          <a:bodyPr wrap="none" rtlCol="0">
+            <a:spAutoFit/>
+          </a:bodyPr>
+          <a:lstStyle/>
+          <a:p>
+            <a:r>
+              <a:rPr lang="en-US" altLang="ko-KR" dirty="0" smtClean="0"/>
+              <a:t>3. </a:t>
+            </a:r>
+            <a:r>
+              <a:rPr lang="ko-KR" altLang="en-US" dirty="0" smtClean="0"/>
+              <a:t>공통 </a:t>
+            </a:r>
+            <a:r>
+              <a:rPr lang="en-US" altLang="ko-KR" dirty="0" smtClean="0"/>
+              <a:t>Error </a:t>
+            </a:r>
+            <a:r>
+              <a:rPr lang="ko-KR" altLang="en-US" dirty="0" smtClean="0"/>
+              <a:t>적용하기</a:t>
+            </a:r>
+            <a:endParaRPr lang="en-US" altLang="ko-KR" dirty="0" smtClean="0"/>
+          </a:p>
+          <a:p>
+            <a:endParaRPr lang="en-US" altLang="ko-KR" dirty="0" smtClean="0"/>
+          </a:p>
+          <a:p>
+            <a:r>
+              <a:rPr lang="en-US" altLang="ko-KR" dirty="0"/>
+              <a:t> </a:t>
+            </a:r>
+            <a:r>
+              <a:rPr lang="en-US" altLang="ko-KR" dirty="0" smtClean="0"/>
+              <a:t> </a:t>
+            </a:r>
+            <a:r>
+              <a:rPr lang="en-US" altLang="ko-KR" dirty="0" err="1" smtClean="0"/>
+              <a:t>ErrorCode</a:t>
+            </a:r>
+            <a:r>
+              <a:rPr lang="en-US" altLang="ko-KR" dirty="0" smtClean="0"/>
+              <a:t> / </a:t>
+            </a:r>
+            <a:r>
+              <a:rPr lang="en-US" altLang="ko-KR" dirty="0" err="1" smtClean="0"/>
+              <a:t>ErrorCodeInf</a:t>
+            </a:r>
+            <a:endParaRPr lang="en-US" altLang="ko-KR" dirty="0" smtClean="0"/>
+          </a:p>
+          <a:p>
+            <a:r>
+              <a:rPr lang="en-US" altLang="ko-KR" dirty="0"/>
+              <a:t> </a:t>
+            </a:r>
+            <a:r>
+              <a:rPr lang="en-US" altLang="ko-KR" dirty="0" smtClean="0"/>
+              <a:t> </a:t>
+            </a:r>
+            <a:r>
+              <a:rPr lang="en-US" altLang="ko-KR" dirty="0" err="1" smtClean="0"/>
+              <a:t>ApiException</a:t>
+            </a:r>
+            <a:r>
+              <a:rPr lang="en-US" altLang="ko-KR" dirty="0" smtClean="0"/>
+              <a:t> / </a:t>
+            </a:r>
+            <a:r>
+              <a:rPr lang="en-US" altLang="ko-KR" dirty="0" err="1" smtClean="0"/>
+              <a:t>ApiExceptionInf</a:t>
+            </a:r>
+            <a:endParaRPr lang="ko-KR" altLang="en-US" dirty="0"/>
+          </a:p>
+        </p:txBody>
+      </p:sp>
+      <p:sp>
+        <p:nvSpPr>
+          <p:cNvPr id="3" name="TextBox 2"/>
+          <p:cNvSpPr txBox="1"/>
+          <p:nvPr/>
+        </p:nvSpPr>
+        <p:spPr>
+          <a:xfrm>
+            <a:off x="7622931" y="822150"/>
+            <a:ext cx="3389069" cy="1477328"/>
+          </a:xfrm>
+          <a:prstGeom prst="rect">
+            <a:avLst/>
+          </a:prstGeom>
+          <a:noFill/>
+        </p:spPr>
+        <p:txBody>
+          <a:bodyPr wrap="none" rtlCol="0">
+            <a:spAutoFit/>
+          </a:bodyPr>
+          <a:lstStyle/>
+          <a:p>
+            <a:r>
+              <a:rPr lang="en-US" altLang="ko-KR" dirty="0" smtClean="0"/>
+              <a:t>4. Interceptor </a:t>
+            </a:r>
+            <a:r>
+              <a:rPr lang="ko-KR" altLang="en-US" dirty="0" smtClean="0"/>
+              <a:t>설정하기</a:t>
+            </a:r>
+            <a:endParaRPr lang="en-US" altLang="ko-KR" dirty="0" smtClean="0"/>
+          </a:p>
+          <a:p>
+            <a:r>
+              <a:rPr lang="en-US" altLang="ko-KR" dirty="0"/>
+              <a:t> </a:t>
+            </a:r>
+            <a:r>
+              <a:rPr lang="en-US" altLang="ko-KR" dirty="0" smtClean="0"/>
+              <a:t>1) </a:t>
+            </a:r>
+            <a:r>
+              <a:rPr lang="en-US" altLang="ko-KR" dirty="0" err="1" smtClean="0"/>
+              <a:t>HandlerMapping</a:t>
+            </a:r>
+            <a:r>
+              <a:rPr lang="en-US" altLang="ko-KR" dirty="0" smtClean="0"/>
+              <a:t> </a:t>
+            </a:r>
+            <a:r>
+              <a:rPr lang="ko-KR" altLang="en-US" dirty="0" smtClean="0"/>
+              <a:t>이전 설정</a:t>
+            </a:r>
+            <a:endParaRPr lang="en-US" altLang="ko-KR" dirty="0" smtClean="0"/>
+          </a:p>
+          <a:p>
+            <a:r>
+              <a:rPr lang="en-US" altLang="ko-KR" dirty="0"/>
+              <a:t> </a:t>
+            </a:r>
+            <a:r>
+              <a:rPr lang="en-US" altLang="ko-KR" dirty="0" smtClean="0"/>
+              <a:t> a. OPTION </a:t>
+            </a:r>
+            <a:r>
+              <a:rPr lang="ko-KR" altLang="en-US" dirty="0" smtClean="0"/>
+              <a:t>메서드 통과</a:t>
+            </a:r>
+            <a:endParaRPr lang="en-US" altLang="ko-KR" dirty="0" smtClean="0"/>
+          </a:p>
+          <a:p>
+            <a:r>
+              <a:rPr lang="en-US" altLang="ko-KR" dirty="0"/>
+              <a:t> </a:t>
+            </a:r>
+            <a:r>
+              <a:rPr lang="en-US" altLang="ko-KR" dirty="0" smtClean="0"/>
+              <a:t> b. RESOURCE </a:t>
+            </a:r>
+            <a:r>
+              <a:rPr lang="ko-KR" altLang="en-US" dirty="0" smtClean="0"/>
+              <a:t>통과</a:t>
+            </a:r>
+            <a:endParaRPr lang="en-US" altLang="ko-KR" dirty="0" smtClean="0"/>
+          </a:p>
+          <a:p>
+            <a:r>
+              <a:rPr lang="en-US" altLang="ko-KR" dirty="0"/>
+              <a:t> </a:t>
+            </a:r>
+            <a:r>
+              <a:rPr lang="en-US" altLang="ko-KR" dirty="0" smtClean="0"/>
+              <a:t> c. </a:t>
+            </a:r>
+            <a:r>
+              <a:rPr lang="ko-KR" altLang="en-US" dirty="0" err="1" smtClean="0"/>
+              <a:t>비인증</a:t>
+            </a:r>
+            <a:r>
+              <a:rPr lang="ko-KR" altLang="en-US" dirty="0" smtClean="0"/>
+              <a:t> </a:t>
+            </a:r>
+            <a:r>
+              <a:rPr lang="en-US" altLang="ko-KR" dirty="0" smtClean="0"/>
+              <a:t>URI </a:t>
+            </a:r>
+            <a:r>
+              <a:rPr lang="ko-KR" altLang="en-US" dirty="0" smtClean="0"/>
+              <a:t>설정</a:t>
+            </a:r>
+            <a:endParaRPr lang="ko-KR" altLang="en-US" dirty="0"/>
+          </a:p>
+        </p:txBody>
+      </p:sp>
     </p:spTree>
     <p:extLst>
       <p:ext uri="{BB962C8B-B14F-4D97-AF65-F5344CB8AC3E}">

</xml_diff>